<commit_message>
Added pictures for my slides on Individual tasks page
</commit_message>
<xml_diff>
--- a/Team Docs/Planning Presentation.pptx
+++ b/Team Docs/Planning Presentation.pptx
@@ -236,7 +236,7 @@
           <a:p>
             <a:fld id="{705E03B7-B591-4A2A-B695-014C5A39F13E}" type="datetimeFigureOut">
               <a:rPr lang="en-US"/>
-              <a:t>5/5/2017</a:t>
+              <a:t>5/7/2017</a:t>
             </a:fld>
             <a:endParaRPr/>
           </a:p>
@@ -401,7 +401,7 @@
           <a:p>
             <a:fld id="{67DFBD7B-E4FB-4AA8-9540-FD148073ACB3}" type="datetimeFigureOut">
               <a:rPr lang="en-US"/>
-              <a:t>5/5/2017</a:t>
+              <a:t>5/7/2017</a:t>
             </a:fld>
             <a:endParaRPr/>
           </a:p>
@@ -1744,7 +1744,7 @@
           <a:p>
             <a:fld id="{A7209051-6E81-43E8-9099-FF6A0C3DCFE8}" type="datetime1">
               <a:rPr lang="en-US"/>
-              <a:t>5/5/2017</a:t>
+              <a:t>5/7/2017</a:t>
             </a:fld>
             <a:endParaRPr/>
           </a:p>
@@ -1945,7 +1945,7 @@
           <a:p>
             <a:fld id="{EDCEAB04-7709-4C1E-A61A-74684A0170FC}" type="datetime1">
               <a:rPr lang="en-US"/>
-              <a:t>5/5/2017</a:t>
+              <a:t>5/7/2017</a:t>
             </a:fld>
             <a:endParaRPr/>
           </a:p>
@@ -2495,7 +2495,7 @@
           <a:p>
             <a:fld id="{0C79BD0D-E0B1-4CED-AC65-708AC79EB9CD}" type="datetime1">
               <a:rPr lang="en-US"/>
-              <a:t>5/5/2017</a:t>
+              <a:t>5/7/2017</a:t>
             </a:fld>
             <a:endParaRPr/>
           </a:p>
@@ -2696,7 +2696,7 @@
           <a:p>
             <a:fld id="{0CC3EA6D-DF0B-4D4B-B359-5F1D1D0E30A4}" type="datetime1">
               <a:rPr lang="en-US"/>
-              <a:t>5/5/2017</a:t>
+              <a:t>5/7/2017</a:t>
             </a:fld>
             <a:endParaRPr/>
           </a:p>
@@ -3300,7 +3300,7 @@
           <a:p>
             <a:fld id="{977EDB99-15BC-4479-BAC5-1E502E66917A}" type="datetime1">
               <a:rPr lang="en-US"/>
-              <a:t>5/5/2017</a:t>
+              <a:t>5/7/2017</a:t>
             </a:fld>
             <a:endParaRPr/>
           </a:p>
@@ -3612,7 +3612,7 @@
           <a:p>
             <a:fld id="{4067C2A3-CD19-48AB-9F64-ECCF75182EDD}" type="datetime1">
               <a:rPr lang="en-US"/>
-              <a:t>5/5/2017</a:t>
+              <a:t>5/7/2017</a:t>
             </a:fld>
             <a:endParaRPr/>
           </a:p>
@@ -4074,7 +4074,7 @@
           <a:p>
             <a:fld id="{0363E8C1-7C87-4705-AB97-8CD17D208E3F}" type="datetime1">
               <a:rPr lang="en-US"/>
-              <a:t>5/5/2017</a:t>
+              <a:t>5/7/2017</a:t>
             </a:fld>
             <a:endParaRPr/>
           </a:p>
@@ -4207,7 +4207,7 @@
           <a:p>
             <a:fld id="{E20C624E-DF92-4841-B9B9-DD11AA239B85}" type="datetime1">
               <a:rPr lang="en-US"/>
-              <a:t>5/5/2017</a:t>
+              <a:t>5/7/2017</a:t>
             </a:fld>
             <a:endParaRPr/>
           </a:p>
@@ -4500,7 +4500,7 @@
           <a:p>
             <a:fld id="{FBDA3AE1-4360-4D5B-BDBC-656B872DD533}" type="datetime1">
               <a:rPr lang="en-US"/>
-              <a:t>5/5/2017</a:t>
+              <a:t>5/7/2017</a:t>
             </a:fld>
             <a:endParaRPr/>
           </a:p>
@@ -4799,7 +4799,7 @@
           <a:p>
             <a:fld id="{20990708-46A4-4851-883E-8DFB8939107E}" type="datetime1">
               <a:rPr lang="en-US"/>
-              <a:t>5/5/2017</a:t>
+              <a:t>5/7/2017</a:t>
             </a:fld>
             <a:endParaRPr/>
           </a:p>
@@ -5083,7 +5083,7 @@
           <a:p>
             <a:fld id="{AE88EFFC-86AE-4294-A319-CAFC2651994B}" type="datetime1">
               <a:rPr lang="en-US"/>
-              <a:t>5/5/2017</a:t>
+              <a:t>5/7/2017</a:t>
             </a:fld>
             <a:endParaRPr/>
           </a:p>
@@ -5665,7 +5665,7 @@
             <a:fld id="{D29E8617-6EA8-4B97-A5E8-E18E98765EE2}" type="datetime1">
               <a:rPr lang="en-US"/>
               <a:pPr/>
-              <a:t>5/5/2017</a:t>
+              <a:t>5/7/2017</a:t>
             </a:fld>
             <a:endParaRPr dirty="0"/>
           </a:p>
@@ -7196,7 +7196,12 @@
             <p:ph type="title"/>
           </p:nvPr>
         </p:nvSpPr>
-        <p:spPr/>
+        <p:spPr>
+          <a:xfrm>
+            <a:off x="1125860" y="585664"/>
+            <a:ext cx="9751060" cy="755104"/>
+          </a:xfrm>
+        </p:spPr>
         <p:txBody>
           <a:bodyPr/>
           <a:lstStyle/>
@@ -7210,45 +7215,50 @@
       </p:sp>
       <p:pic>
         <p:nvPicPr>
-          <p:cNvPr id="3074" name="Picture 2" descr="https://scontent-sea1-1.xx.fbcdn.net/v/t34.0-12/18360533_10158555026810063_1676579627_n.png?oh=9af253b985c0b76448573afa69de76a0&amp;oe=590FAE53"/>
+          <p:cNvPr id="7" name="Picture 6"/>
           <p:cNvPicPr>
-            <a:picLocks noGrp="1" noChangeAspect="1" noChangeArrowheads="1"/>
+            <a:picLocks noChangeAspect="1"/>
           </p:cNvPicPr>
-          <p:nvPr>
-            <p:ph idx="1"/>
-          </p:nvPr>
+          <p:nvPr/>
         </p:nvPicPr>
         <p:blipFill>
-          <a:blip r:embed="rId3">
-            <a:extLst>
-              <a:ext uri="{28A0092B-C50C-407E-A947-70E740481C1C}">
-                <a14:useLocalDpi xmlns:a14="http://schemas.microsoft.com/office/drawing/2010/main" val="0"/>
-              </a:ext>
-            </a:extLst>
-          </a:blip>
-          <a:srcRect/>
+          <a:blip r:embed="rId3"/>
           <a:stretch>
             <a:fillRect/>
           </a:stretch>
         </p:blipFill>
-        <p:spPr bwMode="auto">
+        <p:spPr>
           <a:xfrm>
-            <a:off x="4293002" y="1600200"/>
-            <a:ext cx="3602820" cy="4572000"/>
+            <a:off x="5662364" y="1306659"/>
+            <a:ext cx="6408712" cy="2698405"/>
           </a:xfrm>
           <a:prstGeom prst="rect">
             <a:avLst/>
           </a:prstGeom>
-          <a:noFill/>
-          <a:extLst>
-            <a:ext uri="{909E8E84-426E-40DD-AFC4-6F175D3DCCD1}">
-              <a14:hiddenFill xmlns:a14="http://schemas.microsoft.com/office/drawing/2010/main">
-                <a:solidFill>
-                  <a:srgbClr val="FFFFFF"/>
-                </a:solidFill>
-              </a14:hiddenFill>
-            </a:ext>
-          </a:extLst>
+        </p:spPr>
+      </p:pic>
+      <p:pic>
+        <p:nvPicPr>
+          <p:cNvPr id="8" name="Picture 7"/>
+          <p:cNvPicPr>
+            <a:picLocks noChangeAspect="1"/>
+          </p:cNvPicPr>
+          <p:nvPr/>
+        </p:nvPicPr>
+        <p:blipFill>
+          <a:blip r:embed="rId4"/>
+          <a:stretch>
+            <a:fillRect/>
+          </a:stretch>
+        </p:blipFill>
+        <p:spPr>
+          <a:xfrm>
+            <a:off x="45740" y="1338676"/>
+            <a:ext cx="5613202" cy="5330684"/>
+          </a:xfrm>
+          <a:prstGeom prst="rect">
+            <a:avLst/>
+          </a:prstGeom>
         </p:spPr>
       </p:pic>
     </p:spTree>
@@ -10177,26 +10187,6 @@
 </file>
 
 <file path=customXml/item1.xml><?xml version="1.0" encoding="utf-8"?>
-<?mso-contentType ?>
-<FormTemplates xmlns="http://schemas.microsoft.com/sharepoint/v3/contenttype/forms">
-  <Display>DocumentLibraryForm</Display>
-  <Edit>DocumentLibraryForm</Edit>
-  <New>DocumentLibraryForm</New>
-</FormTemplates>
-</file>
-
-<file path=customXml/item2.xml><?xml version="1.0" encoding="utf-8"?>
-<p:properties xmlns:p="http://schemas.microsoft.com/office/2006/metadata/properties" xmlns:xsi="http://www.w3.org/2001/XMLSchema-instance" xmlns:pc="http://schemas.microsoft.com/office/infopath/2007/PartnerControls">
-  <documentManagement>
-    <VSO_x0020_item_x0020_id xmlns="40262f94-9f35-4ac3-9a90-690165a166b7" xsi:nil="true"/>
-    <Assetid_x0020_ xmlns="40262f94-9f35-4ac3-9a90-690165a166b7" xsi:nil="true"/>
-    <Item_x0020_Details xmlns="40262f94-9f35-4ac3-9a90-690165a166b7" xsi:nil="true"/>
-    <Template_x0020_details xmlns="40262f94-9f35-4ac3-9a90-690165a166b7" xsi:nil="true"/>
-  </documentManagement>
-</p:properties>
-</file>
-
-<file path=customXml/item3.xml><?xml version="1.0" encoding="utf-8"?>
 <ct:contentTypeSchema xmlns:ct="http://schemas.microsoft.com/office/2006/metadata/contentType" xmlns:ma="http://schemas.microsoft.com/office/2006/metadata/properties/metaAttributes" ct:_="" ma:_="" ma:contentTypeName="Document" ma:contentTypeID="0x010100AA3F7D94069FF64A86F7DFF56D60E3BE" ma:contentTypeVersion="6" ma:contentTypeDescription="Create a new document." ma:contentTypeScope="" ma:versionID="c32302c77d4085ecf495bdddb7f5e889">
   <xsd:schema xmlns:xsd="http://www.w3.org/2001/XMLSchema" xmlns:xs="http://www.w3.org/2001/XMLSchema" xmlns:p="http://schemas.microsoft.com/office/2006/metadata/properties" xmlns:ns2="a4f35948-e619-41b3-aa29-22878b09cfd2" xmlns:ns3="40262f94-9f35-4ac3-9a90-690165a166b7" targetNamespace="http://schemas.microsoft.com/office/2006/metadata/properties" ma:root="true" ma:fieldsID="4ab5ae46be95f9d0be6107e8200be7a2" ns2:_="" ns3:_="">
     <xsd:import namespace="a4f35948-e619-41b3-aa29-22878b09cfd2"/>
@@ -10377,10 +10367,41 @@
 </ct:contentTypeSchema>
 </file>
 
+<file path=customXml/item2.xml><?xml version="1.0" encoding="utf-8"?>
+<p:properties xmlns:p="http://schemas.microsoft.com/office/2006/metadata/properties" xmlns:xsi="http://www.w3.org/2001/XMLSchema-instance" xmlns:pc="http://schemas.microsoft.com/office/infopath/2007/PartnerControls">
+  <documentManagement>
+    <VSO_x0020_item_x0020_id xmlns="40262f94-9f35-4ac3-9a90-690165a166b7" xsi:nil="true"/>
+    <Assetid_x0020_ xmlns="40262f94-9f35-4ac3-9a90-690165a166b7" xsi:nil="true"/>
+    <Item_x0020_Details xmlns="40262f94-9f35-4ac3-9a90-690165a166b7" xsi:nil="true"/>
+    <Template_x0020_details xmlns="40262f94-9f35-4ac3-9a90-690165a166b7" xsi:nil="true"/>
+  </documentManagement>
+</p:properties>
+</file>
+
+<file path=customXml/item3.xml><?xml version="1.0" encoding="utf-8"?>
+<?mso-contentType ?>
+<FormTemplates xmlns="http://schemas.microsoft.com/sharepoint/v3/contenttype/forms">
+  <Display>DocumentLibraryForm</Display>
+  <Edit>DocumentLibraryForm</Edit>
+  <New>DocumentLibraryForm</New>
+</FormTemplates>
+</file>
+
 <file path=customXml/itemProps1.xml><?xml version="1.0" encoding="utf-8"?>
-<ds:datastoreItem xmlns:ds="http://schemas.openxmlformats.org/officeDocument/2006/customXml" ds:itemID="{308942AA-0721-4324-BC2C-A3CB43F24E71}">
+<ds:datastoreItem xmlns:ds="http://schemas.openxmlformats.org/officeDocument/2006/customXml" ds:itemID="{FB14945D-DABB-422F-9B28-D299995C9226}">
   <ds:schemaRefs>
-    <ds:schemaRef ds:uri="http://schemas.microsoft.com/sharepoint/v3/contenttype/forms"/>
+    <ds:schemaRef ds:uri="http://schemas.microsoft.com/office/2006/metadata/contentType"/>
+    <ds:schemaRef ds:uri="http://schemas.microsoft.com/office/2006/metadata/properties/metaAttributes"/>
+    <ds:schemaRef ds:uri="http://www.w3.org/2001/XMLSchema"/>
+    <ds:schemaRef ds:uri="http://schemas.microsoft.com/office/2006/metadata/properties"/>
+    <ds:schemaRef ds:uri="a4f35948-e619-41b3-aa29-22878b09cfd2"/>
+    <ds:schemaRef ds:uri="40262f94-9f35-4ac3-9a90-690165a166b7"/>
+    <ds:schemaRef ds:uri="http://schemas.microsoft.com/office/2006/documentManagement/types"/>
+    <ds:schemaRef ds:uri="http://schemas.microsoft.com/office/infopath/2007/PartnerControls"/>
+    <ds:schemaRef ds:uri="http://schemas.openxmlformats.org/package/2006/metadata/core-properties"/>
+    <ds:schemaRef ds:uri="http://purl.org/dc/elements/1.1/"/>
+    <ds:schemaRef ds:uri="http://purl.org/dc/terms/"/>
+    <ds:schemaRef ds:uri="http://schemas.microsoft.com/internal/obd"/>
   </ds:schemaRefs>
 </ds:datastoreItem>
 </file>
@@ -10403,20 +10424,9 @@
 </file>
 
 <file path=customXml/itemProps3.xml><?xml version="1.0" encoding="utf-8"?>
-<ds:datastoreItem xmlns:ds="http://schemas.openxmlformats.org/officeDocument/2006/customXml" ds:itemID="{FB14945D-DABB-422F-9B28-D299995C9226}">
+<ds:datastoreItem xmlns:ds="http://schemas.openxmlformats.org/officeDocument/2006/customXml" ds:itemID="{308942AA-0721-4324-BC2C-A3CB43F24E71}">
   <ds:schemaRefs>
-    <ds:schemaRef ds:uri="http://schemas.microsoft.com/office/2006/metadata/contentType"/>
-    <ds:schemaRef ds:uri="http://schemas.microsoft.com/office/2006/metadata/properties/metaAttributes"/>
-    <ds:schemaRef ds:uri="http://www.w3.org/2001/XMLSchema"/>
-    <ds:schemaRef ds:uri="http://schemas.microsoft.com/office/2006/metadata/properties"/>
-    <ds:schemaRef ds:uri="a4f35948-e619-41b3-aa29-22878b09cfd2"/>
-    <ds:schemaRef ds:uri="40262f94-9f35-4ac3-9a90-690165a166b7"/>
-    <ds:schemaRef ds:uri="http://schemas.microsoft.com/office/2006/documentManagement/types"/>
-    <ds:schemaRef ds:uri="http://schemas.microsoft.com/office/infopath/2007/PartnerControls"/>
-    <ds:schemaRef ds:uri="http://schemas.openxmlformats.org/package/2006/metadata/core-properties"/>
-    <ds:schemaRef ds:uri="http://purl.org/dc/elements/1.1/"/>
-    <ds:schemaRef ds:uri="http://purl.org/dc/terms/"/>
-    <ds:schemaRef ds:uri="http://schemas.microsoft.com/internal/obd"/>
+    <ds:schemaRef ds:uri="http://schemas.microsoft.com/sharepoint/v3/contenttype/forms"/>
   </ds:schemaRefs>
 </ds:datastoreItem>
 </file>
</xml_diff>